<commit_message>
Ensure unique file names
</commit_message>
<xml_diff>
--- a/docs/assets/fractals/curves/golden.pptx
+++ b/docs/assets/fractals/curves/golden.pptx
@@ -197,7 +197,7 @@
           <a:p>
             <a:fld id="{B3645E82-7B42-A74F-8BFC-0AA10BEB2623}" type="datetimeFigureOut">
               <a:rPr lang="en-GB" smtClean="0"/>
-              <a:t>10/11/2024</a:t>
+              <a:t>17/11/2024</a:t>
             </a:fld>
             <a:endParaRPr lang="en-GB"/>
           </a:p>
@@ -508,18 +508,7 @@
           <a:bodyPr/>
           <a:lstStyle/>
           <a:p>
-            <a:r>
-              <a:rPr lang="en-GB" dirty="0"/>
-              <a:t>Golden Dragon – variation of the </a:t>
-            </a:r>
-            <a:r>
-              <a:rPr lang="en-GB" dirty="0" err="1"/>
-              <a:t>Heighway</a:t>
-            </a:r>
-            <a:r>
-              <a:rPr lang="en-GB" dirty="0"/>
-              <a:t> Dragon (change angle and scale factor)</a:t>
-            </a:r>
+            <a:endParaRPr lang="en-GB" dirty="0"/>
           </a:p>
         </p:txBody>
       </p:sp>
@@ -690,7 +679,7 @@
           <a:p>
             <a:fld id="{CD0E8049-E101-1D4D-AC32-01FB6D0C811C}" type="datetimeFigureOut">
               <a:rPr lang="en-GB" smtClean="0"/>
-              <a:t>10/11/2024</a:t>
+              <a:t>17/11/2024</a:t>
             </a:fld>
             <a:endParaRPr lang="en-GB"/>
           </a:p>
@@ -860,7 +849,7 @@
           <a:p>
             <a:fld id="{CD0E8049-E101-1D4D-AC32-01FB6D0C811C}" type="datetimeFigureOut">
               <a:rPr lang="en-GB" smtClean="0"/>
-              <a:t>10/11/2024</a:t>
+              <a:t>17/11/2024</a:t>
             </a:fld>
             <a:endParaRPr lang="en-GB"/>
           </a:p>
@@ -1040,7 +1029,7 @@
           <a:p>
             <a:fld id="{CD0E8049-E101-1D4D-AC32-01FB6D0C811C}" type="datetimeFigureOut">
               <a:rPr lang="en-GB" smtClean="0"/>
-              <a:t>10/11/2024</a:t>
+              <a:t>17/11/2024</a:t>
             </a:fld>
             <a:endParaRPr lang="en-GB"/>
           </a:p>
@@ -1210,7 +1199,7 @@
           <a:p>
             <a:fld id="{CD0E8049-E101-1D4D-AC32-01FB6D0C811C}" type="datetimeFigureOut">
               <a:rPr lang="en-GB" smtClean="0"/>
-              <a:t>10/11/2024</a:t>
+              <a:t>17/11/2024</a:t>
             </a:fld>
             <a:endParaRPr lang="en-GB"/>
           </a:p>
@@ -1454,7 +1443,7 @@
           <a:p>
             <a:fld id="{CD0E8049-E101-1D4D-AC32-01FB6D0C811C}" type="datetimeFigureOut">
               <a:rPr lang="en-GB" smtClean="0"/>
-              <a:t>10/11/2024</a:t>
+              <a:t>17/11/2024</a:t>
             </a:fld>
             <a:endParaRPr lang="en-GB"/>
           </a:p>
@@ -1686,7 +1675,7 @@
           <a:p>
             <a:fld id="{CD0E8049-E101-1D4D-AC32-01FB6D0C811C}" type="datetimeFigureOut">
               <a:rPr lang="en-GB" smtClean="0"/>
-              <a:t>10/11/2024</a:t>
+              <a:t>17/11/2024</a:t>
             </a:fld>
             <a:endParaRPr lang="en-GB"/>
           </a:p>
@@ -2053,7 +2042,7 @@
           <a:p>
             <a:fld id="{CD0E8049-E101-1D4D-AC32-01FB6D0C811C}" type="datetimeFigureOut">
               <a:rPr lang="en-GB" smtClean="0"/>
-              <a:t>10/11/2024</a:t>
+              <a:t>17/11/2024</a:t>
             </a:fld>
             <a:endParaRPr lang="en-GB"/>
           </a:p>
@@ -2171,7 +2160,7 @@
           <a:p>
             <a:fld id="{CD0E8049-E101-1D4D-AC32-01FB6D0C811C}" type="datetimeFigureOut">
               <a:rPr lang="en-GB" smtClean="0"/>
-              <a:t>10/11/2024</a:t>
+              <a:t>17/11/2024</a:t>
             </a:fld>
             <a:endParaRPr lang="en-GB"/>
           </a:p>
@@ -2266,7 +2255,7 @@
           <a:p>
             <a:fld id="{CD0E8049-E101-1D4D-AC32-01FB6D0C811C}" type="datetimeFigureOut">
               <a:rPr lang="en-GB" smtClean="0"/>
-              <a:t>10/11/2024</a:t>
+              <a:t>17/11/2024</a:t>
             </a:fld>
             <a:endParaRPr lang="en-GB"/>
           </a:p>
@@ -2543,7 +2532,7 @@
           <a:p>
             <a:fld id="{CD0E8049-E101-1D4D-AC32-01FB6D0C811C}" type="datetimeFigureOut">
               <a:rPr lang="en-GB" smtClean="0"/>
-              <a:t>10/11/2024</a:t>
+              <a:t>17/11/2024</a:t>
             </a:fld>
             <a:endParaRPr lang="en-GB"/>
           </a:p>
@@ -2800,7 +2789,7 @@
           <a:p>
             <a:fld id="{CD0E8049-E101-1D4D-AC32-01FB6D0C811C}" type="datetimeFigureOut">
               <a:rPr lang="en-GB" smtClean="0"/>
-              <a:t>10/11/2024</a:t>
+              <a:t>17/11/2024</a:t>
             </a:fld>
             <a:endParaRPr lang="en-GB"/>
           </a:p>
@@ -3013,7 +3002,7 @@
           <a:p>
             <a:fld id="{CD0E8049-E101-1D4D-AC32-01FB6D0C811C}" type="datetimeFigureOut">
               <a:rPr lang="en-GB" smtClean="0"/>
-              <a:t>10/11/2024</a:t>
+              <a:t>17/11/2024</a:t>
             </a:fld>
             <a:endParaRPr lang="en-GB"/>
           </a:p>
@@ -3404,6 +3393,14 @@
 <file path=ppt/slides/slide1.xml><?xml version="1.0" encoding="utf-8"?>
 <p:sld xmlns:a="http://schemas.openxmlformats.org/drawingml/2006/main" xmlns:r="http://schemas.openxmlformats.org/officeDocument/2006/relationships" xmlns:p="http://schemas.openxmlformats.org/presentationml/2006/main">
   <p:cSld>
+    <p:bg>
+      <p:bgPr>
+        <a:solidFill>
+          <a:schemeClr val="tx1"/>
+        </a:solidFill>
+        <a:effectLst/>
+      </p:bgPr>
+    </p:bg>
     <p:spTree>
       <p:nvGrpSpPr>
         <p:cNvPr id="1" name=""/>
@@ -3418,43 +3415,8 @@
           <a:chExt cx="0" cy="0"/>
         </a:xfrm>
       </p:grpSpPr>
-      <p:sp>
-        <p:nvSpPr>
-          <p:cNvPr id="2" name="Title 1">
-            <a:extLst>
-              <a:ext uri="{FF2B5EF4-FFF2-40B4-BE49-F238E27FC236}">
-                <a16:creationId xmlns:a16="http://schemas.microsoft.com/office/drawing/2014/main" id="{C87A518F-ECCF-0248-8273-D9A4B5721FED}"/>
-              </a:ext>
-            </a:extLst>
-          </p:cNvPr>
-          <p:cNvSpPr>
-            <a:spLocks noGrp="1"/>
-          </p:cNvSpPr>
-          <p:nvPr>
-            <p:ph type="title"/>
-          </p:nvPr>
-        </p:nvSpPr>
-        <p:spPr>
-          <a:xfrm>
-            <a:off x="714372" y="-835907"/>
-            <a:ext cx="7452658" cy="467601"/>
-          </a:xfrm>
-        </p:spPr>
-        <p:txBody>
-          <a:bodyPr>
-            <a:normAutofit/>
-          </a:bodyPr>
-          <a:lstStyle/>
-          <a:p>
-            <a:r>
-              <a:rPr lang="en-GB" sz="2000" dirty="0"/>
-              <a:t>Golden Dragon</a:t>
-            </a:r>
-          </a:p>
-        </p:txBody>
-      </p:sp>
-      <mc:AlternateContent xmlns:mc="http://schemas.openxmlformats.org/markup-compatibility/2006">
-        <mc:Choice xmlns:pslz="http://schemas.microsoft.com/office/powerpoint/2016/slidezoom" Requires="pslz">
+      <mc:AlternateContent xmlns:mc="http://schemas.openxmlformats.org/markup-compatibility/2006" xmlns:pslz="http://schemas.microsoft.com/office/powerpoint/2016/slidezoom">
+        <mc:Choice Requires="pslz">
           <p:graphicFrame>
             <p:nvGraphicFramePr>
               <p:cNvPr id="4" name="Slide Zoom 3">
@@ -3513,7 +3475,7 @@
             </a:graphic>
           </p:graphicFrame>
         </mc:Choice>
-        <mc:Fallback>
+        <mc:Fallback xmlns="">
           <p:pic>
             <p:nvPicPr>
               <p:cNvPr id="4" name="Slide Zoom 3">
@@ -3530,7 +3492,7 @@
               <p:nvPr/>
             </p:nvPicPr>
             <p:blipFill>
-              <a:blip r:embed="rId3"/>
+              <a:blip r:embed="rId5"/>
               <a:stretch>
                 <a:fillRect/>
               </a:stretch>
@@ -3554,8 +3516,8 @@
           </p:pic>
         </mc:Fallback>
       </mc:AlternateContent>
-      <mc:AlternateContent xmlns:mc="http://schemas.openxmlformats.org/markup-compatibility/2006">
-        <mc:Choice xmlns:pslz="http://schemas.microsoft.com/office/powerpoint/2016/slidezoom" Requires="pslz">
+      <mc:AlternateContent xmlns:mc="http://schemas.openxmlformats.org/markup-compatibility/2006" xmlns:pslz="http://schemas.microsoft.com/office/powerpoint/2016/slidezoom">
+        <mc:Choice Requires="pslz">
           <p:graphicFrame>
             <p:nvGraphicFramePr>
               <p:cNvPr id="6" name="Slide Zoom 5">
@@ -3586,7 +3548,7 @@
                   <pslz:sldZmObj sldId="326" cId="185862242">
                     <pslz:zmPr id="{A7DD5E44-1F56-0642-837F-28FF02F10480}" returnToParent="0" transitionDur="1000" showBg="0">
                       <p166:blipFill xmlns:p166="http://schemas.microsoft.com/office/powerpoint/2016/6/main">
-                        <a:blip r:embed="rId5"/>
+                        <a:blip r:embed="rId6"/>
                         <a:stretch>
                           <a:fillRect/>
                         </a:stretch>
@@ -3614,7 +3576,7 @@
             </a:graphic>
           </p:graphicFrame>
         </mc:Choice>
-        <mc:Fallback>
+        <mc:Fallback xmlns="">
           <p:pic>
             <p:nvPicPr>
               <p:cNvPr id="6" name="Slide Zoom 5">
@@ -3631,7 +3593,7 @@
               <p:nvPr/>
             </p:nvPicPr>
             <p:blipFill>
-              <a:blip r:embed="rId5"/>
+              <a:blip r:embed="rId7"/>
               <a:stretch>
                 <a:fillRect/>
               </a:stretch>
@@ -3655,6 +3617,58 @@
           </p:pic>
         </mc:Fallback>
       </mc:AlternateContent>
+      <p:sp>
+        <p:nvSpPr>
+          <p:cNvPr id="3" name="Oval 2">
+            <a:extLst>
+              <a:ext uri="{FF2B5EF4-FFF2-40B4-BE49-F238E27FC236}">
+                <a16:creationId xmlns:a16="http://schemas.microsoft.com/office/drawing/2014/main" id="{C1531A6A-CE40-0731-1BEF-77AD0DA490EF}"/>
+              </a:ext>
+            </a:extLst>
+          </p:cNvPr>
+          <p:cNvSpPr/>
+          <p:nvPr/>
+        </p:nvSpPr>
+        <p:spPr>
+          <a:xfrm>
+            <a:off x="2632943" y="433131"/>
+            <a:ext cx="421105" cy="421105"/>
+          </a:xfrm>
+          <a:prstGeom prst="ellipse">
+            <a:avLst/>
+          </a:prstGeom>
+          <a:solidFill>
+            <a:srgbClr val="FFC000"/>
+          </a:solidFill>
+          <a:ln>
+            <a:noFill/>
+          </a:ln>
+        </p:spPr>
+        <p:style>
+          <a:lnRef idx="2">
+            <a:schemeClr val="accent1">
+              <a:shade val="50000"/>
+            </a:schemeClr>
+          </a:lnRef>
+          <a:fillRef idx="1">
+            <a:schemeClr val="accent1"/>
+          </a:fillRef>
+          <a:effectRef idx="0">
+            <a:schemeClr val="accent1"/>
+          </a:effectRef>
+          <a:fontRef idx="minor">
+            <a:schemeClr val="lt1"/>
+          </a:fontRef>
+        </p:style>
+        <p:txBody>
+          <a:bodyPr rtlCol="0" anchor="ctr"/>
+          <a:lstStyle/>
+          <a:p>
+            <a:pPr algn="ctr"/>
+            <a:endParaRPr lang="en-GB"/>
+          </a:p>
+        </p:txBody>
+      </p:sp>
     </p:spTree>
     <p:extLst>
       <p:ext uri="{BB962C8B-B14F-4D97-AF65-F5344CB8AC3E}">

</xml_diff>